<commit_message>
Minor typos while recording
</commit_message>
<xml_diff>
--- a/2025/20250401-NegativeProbability.pptx
+++ b/2025/20250401-NegativeProbability.pptx
@@ -24860,61 +24860,7 @@
           <a:p>
             <a:r>
               <a:rPr lang="en-US" dirty="0"/>
-              <a:t>Wigner function for first two solutions of the harmonic oscillator</a:t>
-            </a:r>
-          </a:p>
-        </p:txBody>
-      </p:sp>
-      <p:sp>
-        <p:nvSpPr>
-          <p:cNvPr id="22" name="TextBox 21">
-            <a:extLst>
-              <a:ext uri="{FF2B5EF4-FFF2-40B4-BE49-F238E27FC236}">
-                <a16:creationId xmlns:a16="http://schemas.microsoft.com/office/drawing/2014/main" id="{FDCA06C5-4A42-C0DF-E7B1-4353D7A521FC}"/>
-              </a:ext>
-            </a:extLst>
-          </p:cNvPr>
-          <p:cNvSpPr txBox="1"/>
-          <p:nvPr/>
-        </p:nvSpPr>
-        <p:spPr>
-          <a:xfrm>
-            <a:off x="7860536" y="1789266"/>
-            <a:ext cx="1806905" cy="646331"/>
-          </a:xfrm>
-          <a:prstGeom prst="rect">
-            <a:avLst/>
-          </a:prstGeom>
-          <a:noFill/>
-        </p:spPr>
-        <p:txBody>
-          <a:bodyPr wrap="none" rtlCol="0">
-            <a:spAutoFit/>
-          </a:bodyPr>
-          <a:lstStyle/>
-          <a:p>
-            <a:r>
-              <a:rPr lang="en-US" dirty="0">
-                <a:solidFill>
-                  <a:srgbClr val="C00000"/>
-                </a:solidFill>
-              </a:rPr>
-              <a:t>Can be negative:</a:t>
-            </a:r>
-            <a:br>
-              <a:rPr lang="en-US" dirty="0">
-                <a:solidFill>
-                  <a:srgbClr val="C00000"/>
-                </a:solidFill>
-              </a:rPr>
-            </a:br>
-            <a:r>
-              <a:rPr lang="en-US" dirty="0">
-                <a:solidFill>
-                  <a:srgbClr val="C00000"/>
-                </a:solidFill>
-              </a:rPr>
-              <a:t>no clear meaning</a:t>
+              <a:t>Wigner function for first three solutions of the harmonic oscillator</a:t>
             </a:r>
           </a:p>
         </p:txBody>

</xml_diff>